<commit_message>
Access to NimBLE connection data in main for GUI comms
</commit_message>
<xml_diff>
--- a/resources/architecture graphics.pptx
+++ b/resources/architecture graphics.pptx
@@ -3845,11 +3845,6 @@
               </a:rPr>
               <a:t> </a:t>
             </a:r>
-            <a:endParaRPr lang="en-US" sz="1200" b="1" dirty="0" smtClean="0">
-              <a:solidFill>
-                <a:schemeClr val="tx1"/>
-              </a:solidFill>
-            </a:endParaRPr>
           </a:p>
           <a:p>
             <a:pPr algn="ctr"/>
@@ -3875,21 +3870,8 @@
                   <a:schemeClr val="tx1"/>
                 </a:solidFill>
               </a:rPr>
-              <a:t> </a:t>
-            </a:r>
-            <a:r>
-              <a:rPr lang="en-US" sz="1200" b="1" dirty="0" smtClean="0">
-                <a:solidFill>
-                  <a:schemeClr val="tx1"/>
-                </a:solidFill>
-              </a:rPr>
-              <a:t>V1.6</a:t>
-            </a:r>
-            <a:endParaRPr lang="en-US" sz="1200" b="1" dirty="0" smtClean="0">
-              <a:solidFill>
-                <a:schemeClr val="tx1"/>
-              </a:solidFill>
-            </a:endParaRPr>
+              <a:t> V1.6</a:t>
+            </a:r>
           </a:p>
         </p:txBody>
       </p:sp>
@@ -3940,11 +3922,6 @@
               </a:rPr>
               <a:t>UI server</a:t>
             </a:r>
-            <a:endParaRPr lang="en-US" sz="1200" b="1" dirty="0" smtClean="0">
-              <a:solidFill>
-                <a:srgbClr val="FF0000"/>
-              </a:solidFill>
-            </a:endParaRPr>
           </a:p>
           <a:p>
             <a:pPr algn="ctr"/>
@@ -6114,11 +6091,6 @@
               </a:rPr>
               <a:t>Sound Synthesizer</a:t>
             </a:r>
-            <a:endParaRPr lang="en-US" sz="1200" b="1" dirty="0" smtClean="0">
-              <a:solidFill>
-                <a:srgbClr val="FF0000"/>
-              </a:solidFill>
-            </a:endParaRPr>
           </a:p>
           <a:p>
             <a:pPr algn="ctr"/>
@@ -6128,15 +6100,7 @@
                   <a:schemeClr val="tx1"/>
                 </a:solidFill>
               </a:rPr>
-              <a:t>D</a:t>
-            </a:r>
-            <a:r>
-              <a:rPr lang="en-US" sz="1200" b="1" dirty="0" err="1" smtClean="0">
-                <a:solidFill>
-                  <a:schemeClr val="tx1"/>
-                </a:solidFill>
-              </a:rPr>
-              <a:t>spFaust</a:t>
+              <a:t>DspFaust</a:t>
             </a:r>
             <a:r>
               <a:rPr lang="en-US" sz="1200" b="1" dirty="0" smtClean="0">
@@ -6146,11 +6110,6 @@
               </a:rPr>
               <a:t> API </a:t>
             </a:r>
-            <a:endParaRPr lang="en-US" sz="1200" b="1" dirty="0" smtClean="0">
-              <a:solidFill>
-                <a:schemeClr val="tx1"/>
-              </a:solidFill>
-            </a:endParaRPr>
           </a:p>
           <a:p>
             <a:pPr algn="ctr"/>
@@ -6649,6 +6608,152 @@
           </a:p>
         </p:txBody>
       </p:sp>
+      <p:sp>
+        <p:nvSpPr>
+          <p:cNvPr id="87" name="Flowchart: Magnetic Disk 86"/>
+          <p:cNvSpPr/>
+          <p:nvPr/>
+        </p:nvSpPr>
+        <p:spPr>
+          <a:xfrm>
+            <a:off x="489248" y="3320408"/>
+            <a:ext cx="914400" cy="612648"/>
+          </a:xfrm>
+          <a:prstGeom prst="flowChartMagneticDisk">
+            <a:avLst/>
+          </a:prstGeom>
+        </p:spPr>
+        <p:style>
+          <a:lnRef idx="2">
+            <a:schemeClr val="accent1">
+              <a:shade val="50000"/>
+            </a:schemeClr>
+          </a:lnRef>
+          <a:fillRef idx="1">
+            <a:schemeClr val="accent1"/>
+          </a:fillRef>
+          <a:effectRef idx="0">
+            <a:schemeClr val="accent1"/>
+          </a:effectRef>
+          <a:fontRef idx="minor">
+            <a:schemeClr val="lt1"/>
+          </a:fontRef>
+        </p:style>
+        <p:txBody>
+          <a:bodyPr rtlCol="0" anchor="ctr"/>
+          <a:lstStyle/>
+          <a:p>
+            <a:pPr algn="ctr"/>
+            <a:r>
+              <a:rPr lang="en-US" sz="1200" dirty="0" smtClean="0"/>
+              <a:t>presets</a:t>
+            </a:r>
+          </a:p>
+          <a:p>
+            <a:pPr algn="ctr"/>
+            <a:r>
+              <a:rPr lang="en-US" sz="1200" dirty="0" smtClean="0"/>
+              <a:t>SD-card</a:t>
+            </a:r>
+            <a:endParaRPr lang="en-US" sz="1200" dirty="0"/>
+          </a:p>
+        </p:txBody>
+      </p:sp>
+      <p:grpSp>
+        <p:nvGrpSpPr>
+          <p:cNvPr id="88" name="Group 14"/>
+          <p:cNvGrpSpPr/>
+          <p:nvPr/>
+        </p:nvGrpSpPr>
+        <p:grpSpPr>
+          <a:xfrm rot="16200000" flipH="1">
+            <a:off x="809341" y="2492894"/>
+            <a:ext cx="432050" cy="576065"/>
+            <a:chOff x="2771797" y="2636910"/>
+            <a:chExt cx="432050" cy="576065"/>
+          </a:xfrm>
+        </p:grpSpPr>
+        <p:sp>
+          <p:nvSpPr>
+            <p:cNvPr id="89" name="Right Arrow 88"/>
+            <p:cNvSpPr/>
+            <p:nvPr/>
+          </p:nvSpPr>
+          <p:spPr>
+            <a:xfrm>
+              <a:off x="2771797" y="2636910"/>
+              <a:ext cx="432048" cy="72008"/>
+            </a:xfrm>
+            <a:prstGeom prst="rightArrow">
+              <a:avLst/>
+            </a:prstGeom>
+          </p:spPr>
+          <p:style>
+            <a:lnRef idx="2">
+              <a:schemeClr val="accent3">
+                <a:shade val="50000"/>
+              </a:schemeClr>
+            </a:lnRef>
+            <a:fillRef idx="1">
+              <a:schemeClr val="accent3"/>
+            </a:fillRef>
+            <a:effectRef idx="0">
+              <a:schemeClr val="accent3"/>
+            </a:effectRef>
+            <a:fontRef idx="minor">
+              <a:schemeClr val="lt1"/>
+            </a:fontRef>
+          </p:style>
+          <p:txBody>
+            <a:bodyPr rtlCol="0" anchor="ctr"/>
+            <a:lstStyle/>
+            <a:p>
+              <a:pPr algn="ctr"/>
+              <a:endParaRPr lang="en-US"/>
+            </a:p>
+          </p:txBody>
+        </p:sp>
+        <p:sp>
+          <p:nvSpPr>
+            <p:cNvPr id="90" name="Right Arrow 89"/>
+            <p:cNvSpPr/>
+            <p:nvPr/>
+          </p:nvSpPr>
+          <p:spPr>
+            <a:xfrm flipH="1">
+              <a:off x="2771799" y="3140967"/>
+              <a:ext cx="432048" cy="72008"/>
+            </a:xfrm>
+            <a:prstGeom prst="rightArrow">
+              <a:avLst/>
+            </a:prstGeom>
+          </p:spPr>
+          <p:style>
+            <a:lnRef idx="2">
+              <a:schemeClr val="accent3">
+                <a:shade val="50000"/>
+              </a:schemeClr>
+            </a:lnRef>
+            <a:fillRef idx="1">
+              <a:schemeClr val="accent3"/>
+            </a:fillRef>
+            <a:effectRef idx="0">
+              <a:schemeClr val="accent3"/>
+            </a:effectRef>
+            <a:fontRef idx="minor">
+              <a:schemeClr val="lt1"/>
+            </a:fontRef>
+          </p:style>
+          <p:txBody>
+            <a:bodyPr rtlCol="0" anchor="ctr"/>
+            <a:lstStyle/>
+            <a:p>
+              <a:pPr algn="ctr"/>
+              <a:endParaRPr lang="en-US"/>
+            </a:p>
+          </p:txBody>
+        </p:sp>
+      </p:grpSp>
     </p:spTree>
   </p:cSld>
   <p:clrMapOvr>

</xml_diff>